<commit_message>
Class and Instance Variable
</commit_message>
<xml_diff>
--- a/51_60/ch54_ConstructSelf/ch54_ConstructSelf.pptx
+++ b/51_60/ch54_ConstructSelf/ch54_ConstructSelf.pptx
@@ -3674,7 +3674,7 @@
         <p:spPr>
           <a:xfrm>
             <a:off x="501534" y="1372852"/>
-            <a:ext cx="4502514" cy="2488196"/>
+            <a:ext cx="4502514" cy="2920244"/>
           </a:xfrm>
           <a:ln>
             <a:solidFill>
@@ -3774,21 +3774,8 @@
                   <a:schemeClr val="tx1"/>
                 </a:solidFill>
               </a:rPr>
-              <a:t>The self points to the </a:t>
-            </a:r>
-            <a:r>
-              <a:rPr lang="en-US" altLang="zh-TW" sz="1800">
-                <a:solidFill>
-                  <a:schemeClr val="tx1"/>
-                </a:solidFill>
-              </a:rPr>
-              <a:t>current object.</a:t>
-            </a:r>
-            <a:endParaRPr lang="en-US" altLang="zh-TW" sz="1800" dirty="0">
-              <a:solidFill>
-                <a:schemeClr val="tx1"/>
-              </a:solidFill>
-            </a:endParaRPr>
+              <a:t>The self points to the current object.</a:t>
+            </a:r>
           </a:p>
         </p:txBody>
       </p:sp>

</xml_diff>